<commit_message>
Report exception when @Embedded annotation found on model classes; document updates
</commit_message>
<xml_diff>
--- a/documentation/images.pptx
+++ b/documentation/images.pptx
@@ -9,6 +9,7 @@
     <p:sldId id="257" r:id="rId3"/>
     <p:sldId id="258" r:id="rId4"/>
     <p:sldId id="259" r:id="rId5"/>
+    <p:sldId id="260" r:id="rId6"/>
   </p:sldIdLst>
   <p:sldSz cx="9144000" cy="6858000" type="screen4x3"/>
   <p:notesSz cx="6858000" cy="9144000"/>
@@ -291,7 +292,7 @@
           <a:p>
             <a:fld id="{410E348B-3D49-40CD-91D8-D77A2E3E90F4}" type="datetimeFigureOut">
               <a:rPr lang="en-AU" smtClean="0"/>
-              <a:t>23/10/2011</a:t>
+              <a:t>24/10/2011</a:t>
             </a:fld>
             <a:endParaRPr lang="en-AU"/>
           </a:p>
@@ -461,7 +462,7 @@
           <a:p>
             <a:fld id="{410E348B-3D49-40CD-91D8-D77A2E3E90F4}" type="datetimeFigureOut">
               <a:rPr lang="en-AU" smtClean="0"/>
-              <a:t>23/10/2011</a:t>
+              <a:t>24/10/2011</a:t>
             </a:fld>
             <a:endParaRPr lang="en-AU"/>
           </a:p>
@@ -641,7 +642,7 @@
           <a:p>
             <a:fld id="{410E348B-3D49-40CD-91D8-D77A2E3E90F4}" type="datetimeFigureOut">
               <a:rPr lang="en-AU" smtClean="0"/>
-              <a:t>23/10/2011</a:t>
+              <a:t>24/10/2011</a:t>
             </a:fld>
             <a:endParaRPr lang="en-AU"/>
           </a:p>
@@ -811,7 +812,7 @@
           <a:p>
             <a:fld id="{410E348B-3D49-40CD-91D8-D77A2E3E90F4}" type="datetimeFigureOut">
               <a:rPr lang="en-AU" smtClean="0"/>
-              <a:t>23/10/2011</a:t>
+              <a:t>24/10/2011</a:t>
             </a:fld>
             <a:endParaRPr lang="en-AU"/>
           </a:p>
@@ -1057,7 +1058,7 @@
           <a:p>
             <a:fld id="{410E348B-3D49-40CD-91D8-D77A2E3E90F4}" type="datetimeFigureOut">
               <a:rPr lang="en-AU" smtClean="0"/>
-              <a:t>23/10/2011</a:t>
+              <a:t>24/10/2011</a:t>
             </a:fld>
             <a:endParaRPr lang="en-AU"/>
           </a:p>
@@ -1345,7 +1346,7 @@
           <a:p>
             <a:fld id="{410E348B-3D49-40CD-91D8-D77A2E3E90F4}" type="datetimeFigureOut">
               <a:rPr lang="en-AU" smtClean="0"/>
-              <a:t>23/10/2011</a:t>
+              <a:t>24/10/2011</a:t>
             </a:fld>
             <a:endParaRPr lang="en-AU"/>
           </a:p>
@@ -1767,7 +1768,7 @@
           <a:p>
             <a:fld id="{410E348B-3D49-40CD-91D8-D77A2E3E90F4}" type="datetimeFigureOut">
               <a:rPr lang="en-AU" smtClean="0"/>
-              <a:t>23/10/2011</a:t>
+              <a:t>24/10/2011</a:t>
             </a:fld>
             <a:endParaRPr lang="en-AU"/>
           </a:p>
@@ -1885,7 +1886,7 @@
           <a:p>
             <a:fld id="{410E348B-3D49-40CD-91D8-D77A2E3E90F4}" type="datetimeFigureOut">
               <a:rPr lang="en-AU" smtClean="0"/>
-              <a:t>23/10/2011</a:t>
+              <a:t>24/10/2011</a:t>
             </a:fld>
             <a:endParaRPr lang="en-AU"/>
           </a:p>
@@ -1980,7 +1981,7 @@
           <a:p>
             <a:fld id="{410E348B-3D49-40CD-91D8-D77A2E3E90F4}" type="datetimeFigureOut">
               <a:rPr lang="en-AU" smtClean="0"/>
-              <a:t>23/10/2011</a:t>
+              <a:t>24/10/2011</a:t>
             </a:fld>
             <a:endParaRPr lang="en-AU"/>
           </a:p>
@@ -2257,7 +2258,7 @@
           <a:p>
             <a:fld id="{410E348B-3D49-40CD-91D8-D77A2E3E90F4}" type="datetimeFigureOut">
               <a:rPr lang="en-AU" smtClean="0"/>
-              <a:t>23/10/2011</a:t>
+              <a:t>24/10/2011</a:t>
             </a:fld>
             <a:endParaRPr lang="en-AU"/>
           </a:p>
@@ -2510,7 +2511,7 @@
           <a:p>
             <a:fld id="{410E348B-3D49-40CD-91D8-D77A2E3E90F4}" type="datetimeFigureOut">
               <a:rPr lang="en-AU" smtClean="0"/>
-              <a:t>23/10/2011</a:t>
+              <a:t>24/10/2011</a:t>
             </a:fld>
             <a:endParaRPr lang="en-AU"/>
           </a:p>
@@ -2723,7 +2724,7 @@
           <a:p>
             <a:fld id="{410E348B-3D49-40CD-91D8-D77A2E3E90F4}" type="datetimeFigureOut">
               <a:rPr lang="en-AU" smtClean="0"/>
-              <a:t>23/10/2011</a:t>
+              <a:t>24/10/2011</a:t>
             </a:fld>
             <a:endParaRPr lang="en-AU"/>
           </a:p>
@@ -4195,6 +4196,477 @@
 </p:sld>
 </file>
 
+<file path=ppt/slides/slide5.xml><?xml version="1.0" encoding="utf-8"?>
+<p:sld xmlns:a="http://schemas.openxmlformats.org/drawingml/2006/main" xmlns:r="http://schemas.openxmlformats.org/officeDocument/2006/relationships" xmlns:p="http://schemas.openxmlformats.org/presentationml/2006/main">
+  <p:cSld>
+    <p:spTree>
+      <p:nvGrpSpPr>
+        <p:cNvPr id="1" name=""/>
+        <p:cNvGrpSpPr/>
+        <p:nvPr/>
+      </p:nvGrpSpPr>
+      <p:grpSpPr>
+        <a:xfrm>
+          <a:off x="0" y="0"/>
+          <a:ext cx="0" cy="0"/>
+          <a:chOff x="0" y="0"/>
+          <a:chExt cx="0" cy="0"/>
+        </a:xfrm>
+      </p:grpSpPr>
+      <p:sp>
+        <p:nvSpPr>
+          <p:cNvPr id="5" name="Title 4"/>
+          <p:cNvSpPr>
+            <a:spLocks noGrp="1"/>
+          </p:cNvSpPr>
+          <p:nvPr>
+            <p:ph type="title"/>
+          </p:nvPr>
+        </p:nvSpPr>
+        <p:spPr/>
+        <p:txBody>
+          <a:bodyPr/>
+          <a:lstStyle/>
+          <a:p>
+            <a:r>
+              <a:rPr lang="en-AU" dirty="0" smtClean="0"/>
+              <a:t>Model architecture</a:t>
+            </a:r>
+            <a:endParaRPr lang="en-AU" dirty="0"/>
+          </a:p>
+        </p:txBody>
+      </p:sp>
+      <p:sp>
+        <p:nvSpPr>
+          <p:cNvPr id="6" name="Rounded Rectangle 5"/>
+          <p:cNvSpPr/>
+          <p:nvPr/>
+        </p:nvSpPr>
+        <p:spPr>
+          <a:xfrm>
+            <a:off x="1250876" y="1412776"/>
+            <a:ext cx="6264696" cy="4824536"/>
+          </a:xfrm>
+          <a:prstGeom prst="roundRect">
+            <a:avLst>
+              <a:gd name="adj" fmla="val 6664"/>
+            </a:avLst>
+          </a:prstGeom>
+        </p:spPr>
+        <p:style>
+          <a:lnRef idx="2">
+            <a:schemeClr val="accent3"/>
+          </a:lnRef>
+          <a:fillRef idx="1">
+            <a:schemeClr val="lt1"/>
+          </a:fillRef>
+          <a:effectRef idx="0">
+            <a:schemeClr val="accent3"/>
+          </a:effectRef>
+          <a:fontRef idx="minor">
+            <a:schemeClr val="dk1"/>
+          </a:fontRef>
+        </p:style>
+        <p:txBody>
+          <a:bodyPr rtlCol="0" anchor="ctr"/>
+          <a:lstStyle/>
+          <a:p>
+            <a:pPr algn="ctr"/>
+            <a:endParaRPr lang="en-AU"/>
+          </a:p>
+        </p:txBody>
+      </p:sp>
+      <p:sp>
+        <p:nvSpPr>
+          <p:cNvPr id="7" name="Rounded Rectangle 6"/>
+          <p:cNvSpPr/>
+          <p:nvPr/>
+        </p:nvSpPr>
+        <p:spPr>
+          <a:xfrm>
+            <a:off x="1970956" y="2600908"/>
+            <a:ext cx="4824536" cy="1224136"/>
+          </a:xfrm>
+          <a:prstGeom prst="roundRect">
+            <a:avLst/>
+          </a:prstGeom>
+        </p:spPr>
+        <p:style>
+          <a:lnRef idx="1">
+            <a:schemeClr val="accent3"/>
+          </a:lnRef>
+          <a:fillRef idx="3">
+            <a:schemeClr val="accent3"/>
+          </a:fillRef>
+          <a:effectRef idx="2">
+            <a:schemeClr val="accent3"/>
+          </a:effectRef>
+          <a:fontRef idx="minor">
+            <a:schemeClr val="lt1"/>
+          </a:fontRef>
+        </p:style>
+        <p:txBody>
+          <a:bodyPr rtlCol="0" anchor="ctr"/>
+          <a:lstStyle/>
+          <a:p>
+            <a:pPr algn="ctr"/>
+            <a:r>
+              <a:rPr lang="en-AU" dirty="0" err="1" smtClean="0">
+                <a:solidFill>
+                  <a:schemeClr val="tx1"/>
+                </a:solidFill>
+              </a:rPr>
+              <a:t>Play!Framework</a:t>
+            </a:r>
+            <a:r>
+              <a:rPr lang="en-AU" dirty="0" smtClean="0">
+                <a:solidFill>
+                  <a:schemeClr val="tx1"/>
+                </a:solidFill>
+              </a:rPr>
+              <a:t> DB Model</a:t>
+            </a:r>
+          </a:p>
+          <a:p>
+            <a:pPr algn="ctr"/>
+            <a:r>
+              <a:rPr lang="en-AU" dirty="0" smtClean="0">
+                <a:solidFill>
+                  <a:schemeClr val="tx1"/>
+                </a:solidFill>
+              </a:rPr>
+              <a:t>_key(); _save(); _delete</a:t>
+            </a:r>
+          </a:p>
+          <a:p>
+            <a:pPr algn="ctr"/>
+            <a:r>
+              <a:rPr lang="en-AU" dirty="0" smtClean="0">
+                <a:solidFill>
+                  <a:schemeClr val="tx1"/>
+                </a:solidFill>
+              </a:rPr>
+              <a:t>…</a:t>
+            </a:r>
+            <a:endParaRPr lang="en-AU" dirty="0">
+              <a:solidFill>
+                <a:schemeClr val="tx1"/>
+              </a:solidFill>
+            </a:endParaRPr>
+          </a:p>
+        </p:txBody>
+      </p:sp>
+      <p:sp>
+        <p:nvSpPr>
+          <p:cNvPr id="8" name="Rounded Rectangle 7"/>
+          <p:cNvSpPr/>
+          <p:nvPr/>
+        </p:nvSpPr>
+        <p:spPr>
+          <a:xfrm>
+            <a:off x="1970956" y="1556792"/>
+            <a:ext cx="4824536" cy="936104"/>
+          </a:xfrm>
+          <a:prstGeom prst="roundRect">
+            <a:avLst/>
+          </a:prstGeom>
+        </p:spPr>
+        <p:style>
+          <a:lnRef idx="2">
+            <a:schemeClr val="accent5"/>
+          </a:lnRef>
+          <a:fillRef idx="1">
+            <a:schemeClr val="lt1"/>
+          </a:fillRef>
+          <a:effectRef idx="0">
+            <a:schemeClr val="accent5"/>
+          </a:effectRef>
+          <a:fontRef idx="minor">
+            <a:schemeClr val="dk1"/>
+          </a:fontRef>
+        </p:style>
+        <p:txBody>
+          <a:bodyPr rtlCol="0" anchor="ctr"/>
+          <a:lstStyle/>
+          <a:p>
+            <a:pPr algn="ctr"/>
+            <a:r>
+              <a:rPr lang="en-AU" dirty="0" smtClean="0"/>
+              <a:t>Java Common Object Contract</a:t>
+            </a:r>
+          </a:p>
+          <a:p>
+            <a:pPr algn="ctr"/>
+            <a:r>
+              <a:rPr lang="en-AU" dirty="0" err="1" smtClean="0"/>
+              <a:t>toString</a:t>
+            </a:r>
+            <a:r>
+              <a:rPr lang="en-AU" dirty="0" smtClean="0"/>
+              <a:t>(); </a:t>
+            </a:r>
+            <a:r>
+              <a:rPr lang="en-AU" dirty="0" err="1" smtClean="0"/>
+              <a:t>hashCode</a:t>
+            </a:r>
+            <a:r>
+              <a:rPr lang="en-AU" dirty="0" smtClean="0"/>
+              <a:t>(); equals()</a:t>
+            </a:r>
+            <a:endParaRPr lang="en-AU" dirty="0"/>
+          </a:p>
+        </p:txBody>
+      </p:sp>
+      <p:sp>
+        <p:nvSpPr>
+          <p:cNvPr id="9" name="Rounded Rectangle 8"/>
+          <p:cNvSpPr/>
+          <p:nvPr/>
+        </p:nvSpPr>
+        <p:spPr>
+          <a:xfrm>
+            <a:off x="1970956" y="3933056"/>
+            <a:ext cx="1512168" cy="468052"/>
+          </a:xfrm>
+          <a:prstGeom prst="roundRect">
+            <a:avLst/>
+          </a:prstGeom>
+        </p:spPr>
+        <p:style>
+          <a:lnRef idx="1">
+            <a:schemeClr val="dk1"/>
+          </a:lnRef>
+          <a:fillRef idx="2">
+            <a:schemeClr val="dk1"/>
+          </a:fillRef>
+          <a:effectRef idx="1">
+            <a:schemeClr val="dk1"/>
+          </a:effectRef>
+          <a:fontRef idx="minor">
+            <a:schemeClr val="dk1"/>
+          </a:fontRef>
+        </p:style>
+        <p:txBody>
+          <a:bodyPr rtlCol="0" anchor="ctr"/>
+          <a:lstStyle/>
+          <a:p>
+            <a:pPr algn="ctr"/>
+            <a:r>
+              <a:rPr lang="en-AU" dirty="0" smtClean="0"/>
+              <a:t>CRUD</a:t>
+            </a:r>
+            <a:endParaRPr lang="en-AU" dirty="0"/>
+          </a:p>
+        </p:txBody>
+      </p:sp>
+      <p:sp>
+        <p:nvSpPr>
+          <p:cNvPr id="10" name="Rounded Rectangle 9"/>
+          <p:cNvSpPr/>
+          <p:nvPr/>
+        </p:nvSpPr>
+        <p:spPr>
+          <a:xfrm>
+            <a:off x="3651399" y="3933056"/>
+            <a:ext cx="1440160" cy="468052"/>
+          </a:xfrm>
+          <a:prstGeom prst="roundRect">
+            <a:avLst/>
+          </a:prstGeom>
+          <a:ln/>
+        </p:spPr>
+        <p:style>
+          <a:lnRef idx="1">
+            <a:schemeClr val="accent1"/>
+          </a:lnRef>
+          <a:fillRef idx="2">
+            <a:schemeClr val="accent1"/>
+          </a:fillRef>
+          <a:effectRef idx="1">
+            <a:schemeClr val="accent1"/>
+          </a:effectRef>
+          <a:fontRef idx="minor">
+            <a:schemeClr val="dk1"/>
+          </a:fontRef>
+        </p:style>
+        <p:txBody>
+          <a:bodyPr rtlCol="0" anchor="ctr"/>
+          <a:lstStyle/>
+          <a:p>
+            <a:pPr algn="ctr"/>
+            <a:r>
+              <a:rPr lang="en-AU" dirty="0" smtClean="0"/>
+              <a:t>Query</a:t>
+            </a:r>
+            <a:endParaRPr lang="en-AU" dirty="0"/>
+          </a:p>
+        </p:txBody>
+      </p:sp>
+      <p:sp>
+        <p:nvSpPr>
+          <p:cNvPr id="11" name="Rounded Rectangle 10"/>
+          <p:cNvSpPr/>
+          <p:nvPr/>
+        </p:nvSpPr>
+        <p:spPr>
+          <a:xfrm>
+            <a:off x="5292080" y="3933056"/>
+            <a:ext cx="1503412" cy="468052"/>
+          </a:xfrm>
+          <a:prstGeom prst="roundRect">
+            <a:avLst/>
+          </a:prstGeom>
+        </p:spPr>
+        <p:style>
+          <a:lnRef idx="1">
+            <a:schemeClr val="accent5"/>
+          </a:lnRef>
+          <a:fillRef idx="2">
+            <a:schemeClr val="accent5"/>
+          </a:fillRef>
+          <a:effectRef idx="1">
+            <a:schemeClr val="accent5"/>
+          </a:effectRef>
+          <a:fontRef idx="minor">
+            <a:schemeClr val="dk1"/>
+          </a:fontRef>
+        </p:style>
+        <p:txBody>
+          <a:bodyPr rtlCol="0" anchor="ctr"/>
+          <a:lstStyle/>
+          <a:p>
+            <a:pPr algn="ctr"/>
+            <a:r>
+              <a:rPr lang="en-AU" dirty="0" smtClean="0"/>
+              <a:t>Statistics</a:t>
+            </a:r>
+            <a:endParaRPr lang="en-AU" dirty="0"/>
+          </a:p>
+        </p:txBody>
+      </p:sp>
+      <p:sp>
+        <p:nvSpPr>
+          <p:cNvPr id="12" name="Rounded Rectangle 11"/>
+          <p:cNvSpPr/>
+          <p:nvPr/>
+        </p:nvSpPr>
+        <p:spPr>
+          <a:xfrm>
+            <a:off x="1970956" y="4581128"/>
+            <a:ext cx="4801046" cy="432048"/>
+          </a:xfrm>
+          <a:prstGeom prst="roundRect">
+            <a:avLst/>
+          </a:prstGeom>
+        </p:spPr>
+        <p:style>
+          <a:lnRef idx="1">
+            <a:schemeClr val="accent3"/>
+          </a:lnRef>
+          <a:fillRef idx="2">
+            <a:schemeClr val="accent3"/>
+          </a:fillRef>
+          <a:effectRef idx="1">
+            <a:schemeClr val="accent3"/>
+          </a:effectRef>
+          <a:fontRef idx="minor">
+            <a:schemeClr val="dk1"/>
+          </a:fontRef>
+        </p:style>
+        <p:txBody>
+          <a:bodyPr rtlCol="0" anchor="ctr"/>
+          <a:lstStyle/>
+          <a:p>
+            <a:pPr algn="ctr"/>
+            <a:r>
+              <a:rPr lang="en-AU" dirty="0" err="1" smtClean="0"/>
+              <a:t>MorphiaQuery</a:t>
+            </a:r>
+            <a:endParaRPr lang="en-AU" dirty="0"/>
+          </a:p>
+        </p:txBody>
+      </p:sp>
+      <p:sp>
+        <p:nvSpPr>
+          <p:cNvPr id="16" name="Rounded Rectangle 15"/>
+          <p:cNvSpPr/>
+          <p:nvPr/>
+        </p:nvSpPr>
+        <p:spPr>
+          <a:xfrm>
+            <a:off x="1970956" y="5157192"/>
+            <a:ext cx="4801046" cy="504056"/>
+          </a:xfrm>
+          <a:prstGeom prst="roundRect">
+            <a:avLst/>
+          </a:prstGeom>
+        </p:spPr>
+        <p:style>
+          <a:lnRef idx="2">
+            <a:schemeClr val="accent1">
+              <a:shade val="50000"/>
+            </a:schemeClr>
+          </a:lnRef>
+          <a:fillRef idx="1">
+            <a:schemeClr val="accent1"/>
+          </a:fillRef>
+          <a:effectRef idx="0">
+            <a:schemeClr val="accent1"/>
+          </a:effectRef>
+          <a:fontRef idx="minor">
+            <a:schemeClr val="lt1"/>
+          </a:fontRef>
+        </p:style>
+        <p:txBody>
+          <a:bodyPr rtlCol="0" anchor="ctr"/>
+          <a:lstStyle/>
+          <a:p>
+            <a:pPr algn="ctr"/>
+            <a:r>
+              <a:rPr lang="en-AU" dirty="0" err="1" smtClean="0"/>
+              <a:t>Miscs</a:t>
+            </a:r>
+            <a:r>
+              <a:rPr lang="en-AU" dirty="0"/>
+              <a:t> </a:t>
+            </a:r>
+            <a:r>
+              <a:rPr lang="en-AU" dirty="0" smtClean="0"/>
+              <a:t>(Timestamp, </a:t>
+            </a:r>
+            <a:r>
+              <a:rPr lang="en-AU" dirty="0" err="1" smtClean="0"/>
+              <a:t>LifeCycle</a:t>
+            </a:r>
+            <a:r>
+              <a:rPr lang="en-AU" dirty="0" smtClean="0"/>
+              <a:t>, Low level </a:t>
+            </a:r>
+            <a:r>
+              <a:rPr lang="en-AU" dirty="0" err="1" smtClean="0"/>
+              <a:t>int</a:t>
+            </a:r>
+            <a:r>
+              <a:rPr lang="en-AU" dirty="0" smtClean="0"/>
+              <a:t>…)</a:t>
+            </a:r>
+            <a:endParaRPr lang="en-AU" dirty="0"/>
+          </a:p>
+        </p:txBody>
+      </p:sp>
+    </p:spTree>
+    <p:extLst>
+      <p:ext uri="{BB962C8B-B14F-4D97-AF65-F5344CB8AC3E}">
+        <p14:creationId xmlns:p14="http://schemas.microsoft.com/office/powerpoint/2010/main" val="1958004207"/>
+      </p:ext>
+    </p:extLst>
+  </p:cSld>
+  <p:clrMapOvr>
+    <a:masterClrMapping/>
+  </p:clrMapOvr>
+</p:sld>
+</file>
+
 <file path=ppt/theme/theme1.xml><?xml version="1.0" encoding="utf-8"?>
 <a:theme xmlns:a="http://schemas.openxmlformats.org/drawingml/2006/main" name="Office Theme">
   <a:themeElements>

</xml_diff>